<commit_message>
modificacion tema 6 e indice
</commit_message>
<xml_diff>
--- a/Tema5/REPASO DEL TEMA.pptx
+++ b/Tema5/REPASO DEL TEMA.pptx
@@ -305,7 +305,7 @@
           <a:p>
             <a:fld id="{D6C0405A-891D-49E8-B29F-CB712BE8EB55}" type="datetimeFigureOut">
               <a:rPr lang="es-ES" smtClean="0"/>
-              <a:t>18/04/2023</a:t>
+              <a:t>20/04/2023</a:t>
             </a:fld>
             <a:endParaRPr lang="es-ES" dirty="0"/>
           </a:p>
@@ -503,7 +503,7 @@
           <a:p>
             <a:fld id="{D6C0405A-891D-49E8-B29F-CB712BE8EB55}" type="datetimeFigureOut">
               <a:rPr lang="es-ES" smtClean="0"/>
-              <a:t>18/04/2023</a:t>
+              <a:t>20/04/2023</a:t>
             </a:fld>
             <a:endParaRPr lang="es-ES" dirty="0"/>
           </a:p>
@@ -711,7 +711,7 @@
           <a:p>
             <a:fld id="{D6C0405A-891D-49E8-B29F-CB712BE8EB55}" type="datetimeFigureOut">
               <a:rPr lang="es-ES" smtClean="0"/>
-              <a:t>18/04/2023</a:t>
+              <a:t>20/04/2023</a:t>
             </a:fld>
             <a:endParaRPr lang="es-ES" dirty="0"/>
           </a:p>
@@ -909,7 +909,7 @@
           <a:p>
             <a:fld id="{D6C0405A-891D-49E8-B29F-CB712BE8EB55}" type="datetimeFigureOut">
               <a:rPr lang="es-ES" smtClean="0"/>
-              <a:t>18/04/2023</a:t>
+              <a:t>20/04/2023</a:t>
             </a:fld>
             <a:endParaRPr lang="es-ES" dirty="0"/>
           </a:p>
@@ -1184,7 +1184,7 @@
           <a:p>
             <a:fld id="{D6C0405A-891D-49E8-B29F-CB712BE8EB55}" type="datetimeFigureOut">
               <a:rPr lang="es-ES" smtClean="0"/>
-              <a:t>18/04/2023</a:t>
+              <a:t>20/04/2023</a:t>
             </a:fld>
             <a:endParaRPr lang="es-ES" dirty="0"/>
           </a:p>
@@ -1449,7 +1449,7 @@
           <a:p>
             <a:fld id="{D6C0405A-891D-49E8-B29F-CB712BE8EB55}" type="datetimeFigureOut">
               <a:rPr lang="es-ES" smtClean="0"/>
-              <a:t>18/04/2023</a:t>
+              <a:t>20/04/2023</a:t>
             </a:fld>
             <a:endParaRPr lang="es-ES" dirty="0"/>
           </a:p>
@@ -1861,7 +1861,7 @@
           <a:p>
             <a:fld id="{D6C0405A-891D-49E8-B29F-CB712BE8EB55}" type="datetimeFigureOut">
               <a:rPr lang="es-ES" smtClean="0"/>
-              <a:t>18/04/2023</a:t>
+              <a:t>20/04/2023</a:t>
             </a:fld>
             <a:endParaRPr lang="es-ES" dirty="0"/>
           </a:p>
@@ -2002,7 +2002,7 @@
           <a:p>
             <a:fld id="{D6C0405A-891D-49E8-B29F-CB712BE8EB55}" type="datetimeFigureOut">
               <a:rPr lang="es-ES" smtClean="0"/>
-              <a:t>18/04/2023</a:t>
+              <a:t>20/04/2023</a:t>
             </a:fld>
             <a:endParaRPr lang="es-ES" dirty="0"/>
           </a:p>
@@ -2115,7 +2115,7 @@
           <a:p>
             <a:fld id="{D6C0405A-891D-49E8-B29F-CB712BE8EB55}" type="datetimeFigureOut">
               <a:rPr lang="es-ES" smtClean="0"/>
-              <a:t>18/04/2023</a:t>
+              <a:t>20/04/2023</a:t>
             </a:fld>
             <a:endParaRPr lang="es-ES" dirty="0"/>
           </a:p>
@@ -2426,7 +2426,7 @@
           <a:p>
             <a:fld id="{D6C0405A-891D-49E8-B29F-CB712BE8EB55}" type="datetimeFigureOut">
               <a:rPr lang="es-ES" smtClean="0"/>
-              <a:t>18/04/2023</a:t>
+              <a:t>20/04/2023</a:t>
             </a:fld>
             <a:endParaRPr lang="es-ES" dirty="0"/>
           </a:p>
@@ -2714,7 +2714,7 @@
           <a:p>
             <a:fld id="{D6C0405A-891D-49E8-B29F-CB712BE8EB55}" type="datetimeFigureOut">
               <a:rPr lang="es-ES" smtClean="0"/>
-              <a:t>18/04/2023</a:t>
+              <a:t>20/04/2023</a:t>
             </a:fld>
             <a:endParaRPr lang="es-ES" dirty="0"/>
           </a:p>
@@ -2955,7 +2955,7 @@
           <a:p>
             <a:fld id="{D6C0405A-891D-49E8-B29F-CB712BE8EB55}" type="datetimeFigureOut">
               <a:rPr lang="es-ES" smtClean="0"/>
-              <a:t>18/04/2023</a:t>
+              <a:t>20/04/2023</a:t>
             </a:fld>
             <a:endParaRPr lang="es-ES" dirty="0"/>
           </a:p>

</xml_diff>